<commit_message>
updated figure with arrowtooth re-run
</commit_message>
<xml_diff>
--- a/figures/assessment_sensitivity_analysis/Fig5.pptx
+++ b/figures/assessment_sensitivity_analysis/Fig5.pptx
@@ -243,7 +243,7 @@
           <a:p>
             <a:fld id="{950D6B54-38B6-9045-A833-9DE71793ADA9}" type="datetimeFigureOut">
               <a:rPr lang="en-US" smtClean="0"/>
-              <a:t>7/13/21</a:t>
+              <a:t>11/23/21</a:t>
             </a:fld>
             <a:endParaRPr lang="en-US"/>
           </a:p>
@@ -413,7 +413,7 @@
           <a:p>
             <a:fld id="{950D6B54-38B6-9045-A833-9DE71793ADA9}" type="datetimeFigureOut">
               <a:rPr lang="en-US" smtClean="0"/>
-              <a:t>7/13/21</a:t>
+              <a:t>11/23/21</a:t>
             </a:fld>
             <a:endParaRPr lang="en-US"/>
           </a:p>
@@ -593,7 +593,7 @@
           <a:p>
             <a:fld id="{950D6B54-38B6-9045-A833-9DE71793ADA9}" type="datetimeFigureOut">
               <a:rPr lang="en-US" smtClean="0"/>
-              <a:t>7/13/21</a:t>
+              <a:t>11/23/21</a:t>
             </a:fld>
             <a:endParaRPr lang="en-US"/>
           </a:p>
@@ -763,7 +763,7 @@
           <a:p>
             <a:fld id="{950D6B54-38B6-9045-A833-9DE71793ADA9}" type="datetimeFigureOut">
               <a:rPr lang="en-US" smtClean="0"/>
-              <a:t>7/13/21</a:t>
+              <a:t>11/23/21</a:t>
             </a:fld>
             <a:endParaRPr lang="en-US"/>
           </a:p>
@@ -1007,7 +1007,7 @@
           <a:p>
             <a:fld id="{950D6B54-38B6-9045-A833-9DE71793ADA9}" type="datetimeFigureOut">
               <a:rPr lang="en-US" smtClean="0"/>
-              <a:t>7/13/21</a:t>
+              <a:t>11/23/21</a:t>
             </a:fld>
             <a:endParaRPr lang="en-US"/>
           </a:p>
@@ -1239,7 +1239,7 @@
           <a:p>
             <a:fld id="{950D6B54-38B6-9045-A833-9DE71793ADA9}" type="datetimeFigureOut">
               <a:rPr lang="en-US" smtClean="0"/>
-              <a:t>7/13/21</a:t>
+              <a:t>11/23/21</a:t>
             </a:fld>
             <a:endParaRPr lang="en-US"/>
           </a:p>
@@ -1606,7 +1606,7 @@
           <a:p>
             <a:fld id="{950D6B54-38B6-9045-A833-9DE71793ADA9}" type="datetimeFigureOut">
               <a:rPr lang="en-US" smtClean="0"/>
-              <a:t>7/13/21</a:t>
+              <a:t>11/23/21</a:t>
             </a:fld>
             <a:endParaRPr lang="en-US"/>
           </a:p>
@@ -1724,7 +1724,7 @@
           <a:p>
             <a:fld id="{950D6B54-38B6-9045-A833-9DE71793ADA9}" type="datetimeFigureOut">
               <a:rPr lang="en-US" smtClean="0"/>
-              <a:t>7/13/21</a:t>
+              <a:t>11/23/21</a:t>
             </a:fld>
             <a:endParaRPr lang="en-US"/>
           </a:p>
@@ -1819,7 +1819,7 @@
           <a:p>
             <a:fld id="{950D6B54-38B6-9045-A833-9DE71793ADA9}" type="datetimeFigureOut">
               <a:rPr lang="en-US" smtClean="0"/>
-              <a:t>7/13/21</a:t>
+              <a:t>11/23/21</a:t>
             </a:fld>
             <a:endParaRPr lang="en-US"/>
           </a:p>
@@ -2096,7 +2096,7 @@
           <a:p>
             <a:fld id="{950D6B54-38B6-9045-A833-9DE71793ADA9}" type="datetimeFigureOut">
               <a:rPr lang="en-US" smtClean="0"/>
-              <a:t>7/13/21</a:t>
+              <a:t>11/23/21</a:t>
             </a:fld>
             <a:endParaRPr lang="en-US"/>
           </a:p>
@@ -2353,7 +2353,7 @@
           <a:p>
             <a:fld id="{950D6B54-38B6-9045-A833-9DE71793ADA9}" type="datetimeFigureOut">
               <a:rPr lang="en-US" smtClean="0"/>
-              <a:t>7/13/21</a:t>
+              <a:t>11/23/21</a:t>
             </a:fld>
             <a:endParaRPr lang="en-US"/>
           </a:p>
@@ -2566,7 +2566,7 @@
           <a:p>
             <a:fld id="{950D6B54-38B6-9045-A833-9DE71793ADA9}" type="datetimeFigureOut">
               <a:rPr lang="en-US" smtClean="0"/>
-              <a:t>7/13/21</a:t>
+              <a:t>11/23/21</a:t>
             </a:fld>
             <a:endParaRPr lang="en-US"/>
           </a:p>
@@ -2973,6 +2973,66 @@
       </p:grpSpPr>
       <p:pic>
         <p:nvPicPr>
+          <p:cNvPr id="8" name="Picture 7">
+            <a:extLst>
+              <a:ext uri="{FF2B5EF4-FFF2-40B4-BE49-F238E27FC236}">
+                <a16:creationId xmlns:a16="http://schemas.microsoft.com/office/drawing/2014/main" id="{C3C3274A-A4B7-BB43-9337-1949852B3805}"/>
+              </a:ext>
+            </a:extLst>
+          </p:cNvPr>
+          <p:cNvPicPr>
+            <a:picLocks noChangeAspect="1"/>
+          </p:cNvPicPr>
+          <p:nvPr/>
+        </p:nvPicPr>
+        <p:blipFill>
+          <a:blip r:embed="rId2"/>
+          <a:stretch>
+            <a:fillRect/>
+          </a:stretch>
+        </p:blipFill>
+        <p:spPr>
+          <a:xfrm>
+            <a:off x="0" y="4781038"/>
+            <a:ext cx="3127248" cy="2405575"/>
+          </a:xfrm>
+          <a:prstGeom prst="rect">
+            <a:avLst/>
+          </a:prstGeom>
+        </p:spPr>
+      </p:pic>
+      <p:pic>
+        <p:nvPicPr>
+          <p:cNvPr id="11" name="Picture 10">
+            <a:extLst>
+              <a:ext uri="{FF2B5EF4-FFF2-40B4-BE49-F238E27FC236}">
+                <a16:creationId xmlns:a16="http://schemas.microsoft.com/office/drawing/2014/main" id="{B353BE95-0B0F-274B-BAE0-DCB25105C7AF}"/>
+              </a:ext>
+            </a:extLst>
+          </p:cNvPr>
+          <p:cNvPicPr>
+            <a:picLocks noChangeAspect="1"/>
+          </p:cNvPicPr>
+          <p:nvPr/>
+        </p:nvPicPr>
+        <p:blipFill>
+          <a:blip r:embed="rId3"/>
+          <a:stretch>
+            <a:fillRect/>
+          </a:stretch>
+        </p:blipFill>
+        <p:spPr>
+          <a:xfrm>
+            <a:off x="3137027" y="4781038"/>
+            <a:ext cx="3127248" cy="2405575"/>
+          </a:xfrm>
+          <a:prstGeom prst="rect">
+            <a:avLst/>
+          </a:prstGeom>
+        </p:spPr>
+      </p:pic>
+      <p:pic>
+        <p:nvPicPr>
           <p:cNvPr id="3" name="Picture 2">
             <a:extLst>
               <a:ext uri="{FF2B5EF4-FFF2-40B4-BE49-F238E27FC236}">
@@ -2986,7 +3046,7 @@
           <p:nvPr/>
         </p:nvPicPr>
         <p:blipFill>
-          <a:blip r:embed="rId2"/>
+          <a:blip r:embed="rId4"/>
           <a:stretch>
             <a:fillRect/>
           </a:stretch>
@@ -3016,7 +3076,7 @@
           <p:nvPr/>
         </p:nvPicPr>
         <p:blipFill>
-          <a:blip r:embed="rId3"/>
+          <a:blip r:embed="rId5"/>
           <a:stretch>
             <a:fillRect/>
           </a:stretch>
@@ -3046,7 +3106,7 @@
           <p:nvPr/>
         </p:nvPicPr>
         <p:blipFill>
-          <a:blip r:embed="rId4"/>
+          <a:blip r:embed="rId6"/>
           <a:stretch>
             <a:fillRect/>
           </a:stretch>
@@ -3076,7 +3136,7 @@
           <p:nvPr/>
         </p:nvPicPr>
         <p:blipFill>
-          <a:blip r:embed="rId5"/>
+          <a:blip r:embed="rId7"/>
           <a:stretch>
             <a:fillRect/>
           </a:stretch>
@@ -3084,66 +3144,6 @@
         <p:spPr>
           <a:xfrm>
             <a:off x="3137941" y="2390870"/>
-            <a:ext cx="3126334" cy="2404872"/>
-          </a:xfrm>
-          <a:prstGeom prst="rect">
-            <a:avLst/>
-          </a:prstGeom>
-        </p:spPr>
-      </p:pic>
-      <p:pic>
-        <p:nvPicPr>
-          <p:cNvPr id="14" name="Picture 13">
-            <a:extLst>
-              <a:ext uri="{FF2B5EF4-FFF2-40B4-BE49-F238E27FC236}">
-                <a16:creationId xmlns:a16="http://schemas.microsoft.com/office/drawing/2014/main" id="{200FED34-C003-8A44-A432-4911708063ED}"/>
-              </a:ext>
-            </a:extLst>
-          </p:cNvPr>
-          <p:cNvPicPr>
-            <a:picLocks noChangeAspect="1"/>
-          </p:cNvPicPr>
-          <p:nvPr/>
-        </p:nvPicPr>
-        <p:blipFill>
-          <a:blip r:embed="rId6"/>
-          <a:stretch>
-            <a:fillRect/>
-          </a:stretch>
-        </p:blipFill>
-        <p:spPr>
-          <a:xfrm>
-            <a:off x="0" y="4781741"/>
-            <a:ext cx="3126334" cy="2404872"/>
-          </a:xfrm>
-          <a:prstGeom prst="rect">
-            <a:avLst/>
-          </a:prstGeom>
-        </p:spPr>
-      </p:pic>
-      <p:pic>
-        <p:nvPicPr>
-          <p:cNvPr id="18" name="Picture 17">
-            <a:extLst>
-              <a:ext uri="{FF2B5EF4-FFF2-40B4-BE49-F238E27FC236}">
-                <a16:creationId xmlns:a16="http://schemas.microsoft.com/office/drawing/2014/main" id="{216094DC-6420-5D42-961C-843D98361ED1}"/>
-              </a:ext>
-            </a:extLst>
-          </p:cNvPr>
-          <p:cNvPicPr>
-            <a:picLocks noChangeAspect="1"/>
-          </p:cNvPicPr>
-          <p:nvPr/>
-        </p:nvPicPr>
-        <p:blipFill>
-          <a:blip r:embed="rId7"/>
-          <a:stretch>
-            <a:fillRect/>
-          </a:stretch>
-        </p:blipFill>
-        <p:spPr>
-          <a:xfrm>
-            <a:off x="3137941" y="4781741"/>
             <a:ext cx="3126334" cy="2404872"/>
           </a:xfrm>
           <a:prstGeom prst="rect">

</xml_diff>